<commit_message>
Added font formatting to customer pages
</commit_message>
<xml_diff>
--- a/Travel Experts Project Presentation.pptx
+++ b/Travel Experts Project Presentation.pptx
@@ -19719,23 +19719,6 @@
 </file>
 
 <file path=customXml/item1.xml><?xml version="1.0" encoding="utf-8"?>
-<p:properties xmlns:p="http://schemas.microsoft.com/office/2006/metadata/properties" xmlns:xsi="http://www.w3.org/2001/XMLSchema-instance" xmlns:pc="http://schemas.microsoft.com/office/infopath/2007/PartnerControls">
-  <documentManagement>
-    <MediaServiceKeyPoints xmlns="71af3243-3dd4-4a8d-8c0d-dd76da1f02a5" xsi:nil="true"/>
-  </documentManagement>
-</p:properties>
-</file>
-
-<file path=customXml/item2.xml><?xml version="1.0" encoding="utf-8"?>
-<?mso-contentType ?>
-<FormTemplates xmlns="http://schemas.microsoft.com/sharepoint/v3/contenttype/forms">
-  <Display>DocumentLibraryForm</Display>
-  <Edit>DocumentLibraryForm</Edit>
-  <New>DocumentLibraryForm</New>
-</FormTemplates>
-</file>
-
-<file path=customXml/item3.xml><?xml version="1.0" encoding="utf-8"?>
 <ct:contentTypeSchema xmlns:ct="http://schemas.microsoft.com/office/2006/metadata/contentType" xmlns:ma="http://schemas.microsoft.com/office/2006/metadata/properties/metaAttributes" ct:_="" ma:_="" ma:contentTypeName="Document" ma:contentTypeID="0x01010079F111ED35F8CC479449609E8A0923A6" ma:contentTypeVersion="11" ma:contentTypeDescription="Create a new document." ma:contentTypeScope="" ma:versionID="9677210f24a1be23c92c90fd886aa0aa">
   <xsd:schema xmlns:xsd="http://www.w3.org/2001/XMLSchema" xmlns:xs="http://www.w3.org/2001/XMLSchema" xmlns:p="http://schemas.microsoft.com/office/2006/metadata/properties" xmlns:ns2="71af3243-3dd4-4a8d-8c0d-dd76da1f02a5" xmlns:ns3="16c05727-aa75-4e4a-9b5f-8a80a1165891" targetNamespace="http://schemas.microsoft.com/office/2006/metadata/properties" ma:root="true" ma:fieldsID="60e05723c5c1908df1a1a4ebf11d344e" ns2:_="" ns3:_="">
     <xsd:import namespace="71af3243-3dd4-4a8d-8c0d-dd76da1f02a5"/>
@@ -19946,25 +19929,24 @@
 </ct:contentTypeSchema>
 </file>
 
-<file path=customXml/itemProps1.xml><?xml version="1.0" encoding="utf-8"?>
-<ds:datastoreItem xmlns:ds="http://schemas.openxmlformats.org/officeDocument/2006/customXml" ds:itemID="{AD24716F-C831-4AC2-BB0A-5EC60E4671B3}">
-  <ds:schemaRefs>
-    <ds:schemaRef ds:uri="http://schemas.microsoft.com/office/2006/metadata/properties"/>
-    <ds:schemaRef ds:uri="http://schemas.microsoft.com/office/infopath/2007/PartnerControls"/>
-    <ds:schemaRef ds:uri="71af3243-3dd4-4a8d-8c0d-dd76da1f02a5"/>
-  </ds:schemaRefs>
-</ds:datastoreItem>
+<file path=customXml/item2.xml><?xml version="1.0" encoding="utf-8"?>
+<?mso-contentType ?>
+<FormTemplates xmlns="http://schemas.microsoft.com/sharepoint/v3/contenttype/forms">
+  <Display>DocumentLibraryForm</Display>
+  <Edit>DocumentLibraryForm</Edit>
+  <New>DocumentLibraryForm</New>
+</FormTemplates>
 </file>
 
-<file path=customXml/itemProps2.xml><?xml version="1.0" encoding="utf-8"?>
-<ds:datastoreItem xmlns:ds="http://schemas.openxmlformats.org/officeDocument/2006/customXml" ds:itemID="{58F3D8C7-1E6F-4D15-8163-ADBC81A00AAD}">
-  <ds:schemaRefs>
-    <ds:schemaRef ds:uri="http://schemas.microsoft.com/sharepoint/v3/contenttype/forms"/>
-  </ds:schemaRefs>
-</ds:datastoreItem>
+<file path=customXml/item3.xml><?xml version="1.0" encoding="utf-8"?>
+<p:properties xmlns:p="http://schemas.microsoft.com/office/2006/metadata/properties" xmlns:xsi="http://www.w3.org/2001/XMLSchema-instance" xmlns:pc="http://schemas.microsoft.com/office/infopath/2007/PartnerControls">
+  <documentManagement>
+    <MediaServiceKeyPoints xmlns="71af3243-3dd4-4a8d-8c0d-dd76da1f02a5" xsi:nil="true"/>
+  </documentManagement>
+</p:properties>
 </file>
 
-<file path=customXml/itemProps3.xml><?xml version="1.0" encoding="utf-8"?>
+<file path=customXml/itemProps1.xml><?xml version="1.0" encoding="utf-8"?>
 <ds:datastoreItem xmlns:ds="http://schemas.openxmlformats.org/officeDocument/2006/customXml" ds:itemID="{F3A8986E-DA64-415A-A390-AF2FFA01BA73}">
   <ds:schemaRefs>
     <ds:schemaRef ds:uri="http://schemas.microsoft.com/office/2006/metadata/contentType"/>
@@ -19981,4 +19963,22 @@
     <ds:schemaRef ds:uri="http://schemas.microsoft.com/internal/obd"/>
   </ds:schemaRefs>
 </ds:datastoreItem>
+</file>
+
+<file path=customXml/itemProps2.xml><?xml version="1.0" encoding="utf-8"?>
+<ds:datastoreItem xmlns:ds="http://schemas.openxmlformats.org/officeDocument/2006/customXml" ds:itemID="{58F3D8C7-1E6F-4D15-8163-ADBC81A00AAD}">
+  <ds:schemaRefs>
+    <ds:schemaRef ds:uri="http://schemas.microsoft.com/sharepoint/v3/contenttype/forms"/>
+  </ds:schemaRefs>
+</ds:datastoreItem>
+</file>
+
+<file path=customXml/itemProps3.xml><?xml version="1.0" encoding="utf-8"?>
+<ds:datastoreItem xmlns:ds="http://schemas.openxmlformats.org/officeDocument/2006/customXml" ds:itemID="{AD24716F-C831-4AC2-BB0A-5EC60E4671B3}">
+  <ds:schemaRefs>
+    <ds:schemaRef ds:uri="http://schemas.microsoft.com/office/2006/metadata/properties"/>
+    <ds:schemaRef ds:uri="http://schemas.microsoft.com/office/infopath/2007/PartnerControls"/>
+    <ds:schemaRef ds:uri="71af3243-3dd4-4a8d-8c0d-dd76da1f02a5"/>
+  </ds:schemaRefs>
+</ds:datastoreItem>
 </file>
</xml_diff>

<commit_message>
Edited 2nd slid in presentation
</commit_message>
<xml_diff>
--- a/Travel Experts Project Presentation.pptx
+++ b/Travel Experts Project Presentation.pptx
@@ -201,7 +201,7 @@
           <a:p>
             <a:fld id="{0D8968FE-AD3D-444F-B6A8-796D946DC3A6}" type="datetimeFigureOut">
               <a:rPr lang="en-US" smtClean="0"/>
-              <a:t>2/18/2020</a:t>
+              <a:t>2/19/2020</a:t>
             </a:fld>
             <a:endParaRPr lang="en-US" dirty="0"/>
           </a:p>
@@ -1877,7 +1877,7 @@
           <a:p>
             <a:fld id="{198E66DD-51B1-4BF7-9539-DEA51BFAEFD8}" type="datetime1">
               <a:rPr lang="en-US" smtClean="0"/>
-              <a:t>2/18/2020</a:t>
+              <a:t>2/19/2020</a:t>
             </a:fld>
             <a:endParaRPr lang="en-US" dirty="0"/>
           </a:p>
@@ -3331,7 +3331,7 @@
           <a:p>
             <a:fld id="{827A6260-7573-4697-9E59-AA19A1D5C255}" type="datetime1">
               <a:rPr lang="en-US" smtClean="0"/>
-              <a:t>2/18/2020</a:t>
+              <a:t>2/19/2020</a:t>
             </a:fld>
             <a:endParaRPr lang="en-US" dirty="0"/>
           </a:p>
@@ -4779,7 +4779,7 @@
           <a:p>
             <a:fld id="{AB049DE4-AD7B-432F-9E35-775F5F8CC6AD}" type="datetime1">
               <a:rPr lang="en-US" smtClean="0"/>
-              <a:t>2/18/2020</a:t>
+              <a:t>2/19/2020</a:t>
             </a:fld>
             <a:endParaRPr lang="en-US" dirty="0"/>
           </a:p>
@@ -6229,7 +6229,7 @@
           <a:p>
             <a:fld id="{CED204F4-028A-4A36-B306-1FBAFF258B24}" type="datetime1">
               <a:rPr lang="en-US" smtClean="0"/>
-              <a:t>2/18/2020</a:t>
+              <a:t>2/19/2020</a:t>
             </a:fld>
             <a:endParaRPr lang="en-US" dirty="0"/>
           </a:p>
@@ -7732,7 +7732,7 @@
           <a:p>
             <a:fld id="{A7569E6D-812C-4C70-BB51-98F32992DB43}" type="datetime1">
               <a:rPr lang="en-US" smtClean="0"/>
-              <a:t>2/18/2020</a:t>
+              <a:t>2/19/2020</a:t>
             </a:fld>
             <a:endParaRPr lang="en-US" dirty="0"/>
           </a:p>
@@ -9248,7 +9248,7 @@
           <a:p>
             <a:fld id="{F10287DF-640A-4181-8B82-4913718EF244}" type="datetime1">
               <a:rPr lang="en-US" smtClean="0"/>
-              <a:t>2/18/2020</a:t>
+              <a:t>2/19/2020</a:t>
             </a:fld>
             <a:endParaRPr lang="en-US" dirty="0"/>
           </a:p>
@@ -10908,7 +10908,7 @@
           <a:p>
             <a:fld id="{C74BE3E1-3173-4AB6-90EF-CE84B9FBD77E}" type="datetime1">
               <a:rPr lang="en-US" smtClean="0"/>
-              <a:t>2/18/2020</a:t>
+              <a:t>2/19/2020</a:t>
             </a:fld>
             <a:endParaRPr lang="en-US" dirty="0"/>
           </a:p>
@@ -12301,7 +12301,7 @@
           <a:p>
             <a:fld id="{CE46D357-68ED-48AA-AC18-9CC27DEA9490}" type="datetime1">
               <a:rPr lang="en-US" smtClean="0"/>
-              <a:t>2/18/2020</a:t>
+              <a:t>2/19/2020</a:t>
             </a:fld>
             <a:endParaRPr lang="en-US" dirty="0"/>
           </a:p>
@@ -12396,7 +12396,7 @@
           <a:p>
             <a:fld id="{ACC8BAEE-D0AF-4323-A024-1416F995B386}" type="datetime1">
               <a:rPr lang="en-US" smtClean="0"/>
-              <a:t>2/18/2020</a:t>
+              <a:t>2/19/2020</a:t>
             </a:fld>
             <a:endParaRPr lang="en-US" dirty="0"/>
           </a:p>
@@ -13917,7 +13917,7 @@
           <a:p>
             <a:fld id="{CD36E0D4-CA65-4DD1-8546-2CC4E75B8B9D}" type="datetime1">
               <a:rPr lang="en-US" smtClean="0"/>
-              <a:t>2/18/2020</a:t>
+              <a:t>2/19/2020</a:t>
             </a:fld>
             <a:endParaRPr lang="en-US" dirty="0"/>
           </a:p>
@@ -15448,7 +15448,7 @@
           <a:p>
             <a:fld id="{C19DEFE7-E1FA-4CA7-8A5A-F9AB210CE638}" type="datetime1">
               <a:rPr lang="en-US" smtClean="0"/>
-              <a:t>2/18/2020</a:t>
+              <a:t>2/19/2020</a:t>
             </a:fld>
             <a:endParaRPr lang="en-US" dirty="0"/>
           </a:p>
@@ -15666,7 +15666,7 @@
           <a:p>
             <a:fld id="{FD1E3FCC-785C-4EC4-B782-9133218B75DD}" type="datetime1">
               <a:rPr lang="en-US" smtClean="0"/>
-              <a:t>2/18/2020</a:t>
+              <a:t>2/19/2020</a:t>
             </a:fld>
             <a:endParaRPr lang="en-US" dirty="0"/>
           </a:p>
@@ -18771,18 +18771,19 @@
             <a:pPr lvl="1"/>
             <a:r>
               <a:rPr lang="en-US" dirty="0"/>
-              <a:t>Enables employees to access, modify, add  and delete packages, products, and suppliers</a:t>
+              <a:t>Packages,  products, and suppliers</a:t>
             </a:r>
           </a:p>
           <a:p>
             <a:pPr lvl="1"/>
-            <a:endParaRPr lang="en-US" dirty="0"/>
+            <a:r>
+              <a:rPr lang="en-US" dirty="0"/>
+              <a:t>Modify, add,  and delete</a:t>
+            </a:r>
           </a:p>
           <a:p>
-            <a:pPr marL="457200" lvl="1" indent="0">
-              <a:buNone/>
-            </a:pPr>
-            <a:endParaRPr lang="en-US" dirty="0"/>
+            <a:pPr lvl="1"/>
+            <a:endParaRPr lang="en-US" i="1" dirty="0"/>
           </a:p>
           <a:p>
             <a:r>
@@ -18794,7 +18795,28 @@
             <a:pPr lvl="1"/>
             <a:r>
               <a:rPr lang="en-US" dirty="0"/>
-              <a:t>Enables clients to register, review their booking details, update their personal information and view their activities</a:t>
+              <a:t>Enables clients to register </a:t>
+            </a:r>
+          </a:p>
+          <a:p>
+            <a:pPr lvl="1"/>
+            <a:r>
+              <a:rPr lang="en-US" dirty="0"/>
+              <a:t>Review their booking details</a:t>
+            </a:r>
+          </a:p>
+          <a:p>
+            <a:pPr lvl="1"/>
+            <a:r>
+              <a:rPr lang="en-US" dirty="0"/>
+              <a:t>Update their personal information </a:t>
+            </a:r>
+          </a:p>
+          <a:p>
+            <a:pPr lvl="1"/>
+            <a:r>
+              <a:rPr lang="en-US" dirty="0"/>
+              <a:t>View their activities</a:t>
             </a:r>
           </a:p>
           <a:p>
@@ -18871,7 +18893,7 @@
             <a:pPr algn="l"/>
             <a:r>
               <a:rPr lang="en-US" sz="3200" dirty="0"/>
-              <a:t>Webform Application</a:t>
+              <a:t>Windows Application</a:t>
             </a:r>
           </a:p>
         </p:txBody>
@@ -19719,6 +19741,23 @@
 </file>
 
 <file path=customXml/item1.xml><?xml version="1.0" encoding="utf-8"?>
+<p:properties xmlns:p="http://schemas.microsoft.com/office/2006/metadata/properties" xmlns:xsi="http://www.w3.org/2001/XMLSchema-instance" xmlns:pc="http://schemas.microsoft.com/office/infopath/2007/PartnerControls">
+  <documentManagement>
+    <MediaServiceKeyPoints xmlns="71af3243-3dd4-4a8d-8c0d-dd76da1f02a5" xsi:nil="true"/>
+  </documentManagement>
+</p:properties>
+</file>
+
+<file path=customXml/item2.xml><?xml version="1.0" encoding="utf-8"?>
+<?mso-contentType ?>
+<FormTemplates xmlns="http://schemas.microsoft.com/sharepoint/v3/contenttype/forms">
+  <Display>DocumentLibraryForm</Display>
+  <Edit>DocumentLibraryForm</Edit>
+  <New>DocumentLibraryForm</New>
+</FormTemplates>
+</file>
+
+<file path=customXml/item3.xml><?xml version="1.0" encoding="utf-8"?>
 <ct:contentTypeSchema xmlns:ct="http://schemas.microsoft.com/office/2006/metadata/contentType" xmlns:ma="http://schemas.microsoft.com/office/2006/metadata/properties/metaAttributes" ct:_="" ma:_="" ma:contentTypeName="Document" ma:contentTypeID="0x01010079F111ED35F8CC479449609E8A0923A6" ma:contentTypeVersion="11" ma:contentTypeDescription="Create a new document." ma:contentTypeScope="" ma:versionID="9677210f24a1be23c92c90fd886aa0aa">
   <xsd:schema xmlns:xsd="http://www.w3.org/2001/XMLSchema" xmlns:xs="http://www.w3.org/2001/XMLSchema" xmlns:p="http://schemas.microsoft.com/office/2006/metadata/properties" xmlns:ns2="71af3243-3dd4-4a8d-8c0d-dd76da1f02a5" xmlns:ns3="16c05727-aa75-4e4a-9b5f-8a80a1165891" targetNamespace="http://schemas.microsoft.com/office/2006/metadata/properties" ma:root="true" ma:fieldsID="60e05723c5c1908df1a1a4ebf11d344e" ns2:_="" ns3:_="">
     <xsd:import namespace="71af3243-3dd4-4a8d-8c0d-dd76da1f02a5"/>
@@ -19929,24 +19968,25 @@
 </ct:contentTypeSchema>
 </file>
 
-<file path=customXml/item2.xml><?xml version="1.0" encoding="utf-8"?>
-<?mso-contentType ?>
-<FormTemplates xmlns="http://schemas.microsoft.com/sharepoint/v3/contenttype/forms">
-  <Display>DocumentLibraryForm</Display>
-  <Edit>DocumentLibraryForm</Edit>
-  <New>DocumentLibraryForm</New>
-</FormTemplates>
+<file path=customXml/itemProps1.xml><?xml version="1.0" encoding="utf-8"?>
+<ds:datastoreItem xmlns:ds="http://schemas.openxmlformats.org/officeDocument/2006/customXml" ds:itemID="{AD24716F-C831-4AC2-BB0A-5EC60E4671B3}">
+  <ds:schemaRefs>
+    <ds:schemaRef ds:uri="http://schemas.microsoft.com/office/2006/metadata/properties"/>
+    <ds:schemaRef ds:uri="http://schemas.microsoft.com/office/infopath/2007/PartnerControls"/>
+    <ds:schemaRef ds:uri="71af3243-3dd4-4a8d-8c0d-dd76da1f02a5"/>
+  </ds:schemaRefs>
+</ds:datastoreItem>
 </file>
 
-<file path=customXml/item3.xml><?xml version="1.0" encoding="utf-8"?>
-<p:properties xmlns:p="http://schemas.microsoft.com/office/2006/metadata/properties" xmlns:xsi="http://www.w3.org/2001/XMLSchema-instance" xmlns:pc="http://schemas.microsoft.com/office/infopath/2007/PartnerControls">
-  <documentManagement>
-    <MediaServiceKeyPoints xmlns="71af3243-3dd4-4a8d-8c0d-dd76da1f02a5" xsi:nil="true"/>
-  </documentManagement>
-</p:properties>
+<file path=customXml/itemProps2.xml><?xml version="1.0" encoding="utf-8"?>
+<ds:datastoreItem xmlns:ds="http://schemas.openxmlformats.org/officeDocument/2006/customXml" ds:itemID="{58F3D8C7-1E6F-4D15-8163-ADBC81A00AAD}">
+  <ds:schemaRefs>
+    <ds:schemaRef ds:uri="http://schemas.microsoft.com/sharepoint/v3/contenttype/forms"/>
+  </ds:schemaRefs>
+</ds:datastoreItem>
 </file>
 
-<file path=customXml/itemProps1.xml><?xml version="1.0" encoding="utf-8"?>
+<file path=customXml/itemProps3.xml><?xml version="1.0" encoding="utf-8"?>
 <ds:datastoreItem xmlns:ds="http://schemas.openxmlformats.org/officeDocument/2006/customXml" ds:itemID="{F3A8986E-DA64-415A-A390-AF2FFA01BA73}">
   <ds:schemaRefs>
     <ds:schemaRef ds:uri="http://schemas.microsoft.com/office/2006/metadata/contentType"/>
@@ -19963,22 +20003,4 @@
     <ds:schemaRef ds:uri="http://schemas.microsoft.com/internal/obd"/>
   </ds:schemaRefs>
 </ds:datastoreItem>
-</file>
-
-<file path=customXml/itemProps2.xml><?xml version="1.0" encoding="utf-8"?>
-<ds:datastoreItem xmlns:ds="http://schemas.openxmlformats.org/officeDocument/2006/customXml" ds:itemID="{58F3D8C7-1E6F-4D15-8163-ADBC81A00AAD}">
-  <ds:schemaRefs>
-    <ds:schemaRef ds:uri="http://schemas.microsoft.com/sharepoint/v3/contenttype/forms"/>
-  </ds:schemaRefs>
-</ds:datastoreItem>
-</file>
-
-<file path=customXml/itemProps3.xml><?xml version="1.0" encoding="utf-8"?>
-<ds:datastoreItem xmlns:ds="http://schemas.openxmlformats.org/officeDocument/2006/customXml" ds:itemID="{AD24716F-C831-4AC2-BB0A-5EC60E4671B3}">
-  <ds:schemaRefs>
-    <ds:schemaRef ds:uri="http://schemas.microsoft.com/office/2006/metadata/properties"/>
-    <ds:schemaRef ds:uri="http://schemas.microsoft.com/office/infopath/2007/PartnerControls"/>
-    <ds:schemaRef ds:uri="71af3243-3dd4-4a8d-8c0d-dd76da1f02a5"/>
-  </ds:schemaRefs>
-</ds:datastoreItem>
 </file>
</xml_diff>

<commit_message>
Update Travel Experts Project Presentation.pptx
</commit_message>
<xml_diff>
--- a/Travel Experts Project Presentation.pptx
+++ b/Travel Experts Project Presentation.pptx
@@ -18771,14 +18771,22 @@
             <a:pPr lvl="1"/>
             <a:r>
               <a:rPr lang="en-US" dirty="0"/>
-              <a:t>Packages,  products, and suppliers</a:t>
+              <a:t>Packages, products, and suppliers</a:t>
             </a:r>
           </a:p>
           <a:p>
             <a:pPr lvl="1"/>
             <a:r>
               <a:rPr lang="en-US" dirty="0"/>
-              <a:t>Modify, add,  and delete</a:t>
+              <a:t>Modify, add</a:t>
+            </a:r>
+            <a:r>
+              <a:rPr lang="en-US"/>
+              <a:t>, and </a:t>
+            </a:r>
+            <a:r>
+              <a:rPr lang="en-US" dirty="0"/>
+              <a:t>delete</a:t>
             </a:r>
           </a:p>
           <a:p>

</xml_diff>